<commit_message>
Video for 1st discussion.
</commit_message>
<xml_diff>
--- a/Project/Presentations/1stDiscussion.pptx
+++ b/Project/Presentations/1stDiscussion.pptx
@@ -129,7 +129,7 @@
 <file path=ppt/revisionInfo.xml><?xml version="1.0" encoding="utf-8"?>
 <p1510:revInfo xmlns:a="http://schemas.openxmlformats.org/drawingml/2006/main" xmlns:r="http://schemas.openxmlformats.org/officeDocument/2006/relationships" xmlns:p1510="http://schemas.microsoft.com/office/powerpoint/2015/10/main">
   <p1510:revLst>
-    <p1510:client id="{911E53D0-6D11-4D04-8F07-4E216A199E4D}" v="23" dt="2020-05-15T07:23:32.464"/>
+    <p1510:client id="{911E53D0-6D11-4D04-8F07-4E216A199E4D}" v="26" dt="2020-05-15T07:43:05.273"/>
   </p1510:revLst>
 </p1510:revInfo>
 </file>
@@ -139,18 +139,18 @@
   <pc:docChgLst>
     <pc:chgData name="Marco Delgado Schwartz" userId="b344b2188dd7c69c" providerId="LiveId" clId="{911E53D0-6D11-4D04-8F07-4E216A199E4D}"/>
     <pc:docChg chg="undo custSel addSld delSld modSld modMainMaster">
-      <pc:chgData name="Marco Delgado Schwartz" userId="b344b2188dd7c69c" providerId="LiveId" clId="{911E53D0-6D11-4D04-8F07-4E216A199E4D}" dt="2020-05-15T07:27:57.696" v="550" actId="167"/>
+      <pc:chgData name="Marco Delgado Schwartz" userId="b344b2188dd7c69c" providerId="LiveId" clId="{911E53D0-6D11-4D04-8F07-4E216A199E4D}" dt="2020-05-15T08:12:09.907" v="628" actId="47"/>
       <pc:docMkLst>
         <pc:docMk/>
       </pc:docMkLst>
       <pc:sldChg chg="addSp modSp new mod">
-        <pc:chgData name="Marco Delgado Schwartz" userId="b344b2188dd7c69c" providerId="LiveId" clId="{911E53D0-6D11-4D04-8F07-4E216A199E4D}" dt="2020-05-15T07:25:55.175" v="549" actId="14100"/>
+        <pc:chgData name="Marco Delgado Schwartz" userId="b344b2188dd7c69c" providerId="LiveId" clId="{911E53D0-6D11-4D04-8F07-4E216A199E4D}" dt="2020-05-15T07:46:14.878" v="627" actId="20577"/>
         <pc:sldMkLst>
           <pc:docMk/>
           <pc:sldMk cId="3485031575" sldId="256"/>
         </pc:sldMkLst>
         <pc:spChg chg="mod">
-          <ac:chgData name="Marco Delgado Schwartz" userId="b344b2188dd7c69c" providerId="LiveId" clId="{911E53D0-6D11-4D04-8F07-4E216A199E4D}" dt="2020-05-15T07:25:13.528" v="530" actId="20577"/>
+          <ac:chgData name="Marco Delgado Schwartz" userId="b344b2188dd7c69c" providerId="LiveId" clId="{911E53D0-6D11-4D04-8F07-4E216A199E4D}" dt="2020-05-15T07:46:14.878" v="627" actId="20577"/>
           <ac:spMkLst>
             <pc:docMk/>
             <pc:sldMk cId="3485031575" sldId="256"/>
@@ -158,7 +158,7 @@
           </ac:spMkLst>
         </pc:spChg>
         <pc:spChg chg="mod">
-          <ac:chgData name="Marco Delgado Schwartz" userId="b344b2188dd7c69c" providerId="LiveId" clId="{911E53D0-6D11-4D04-8F07-4E216A199E4D}" dt="2020-05-15T07:25:55.175" v="549" actId="14100"/>
+          <ac:chgData name="Marco Delgado Schwartz" userId="b344b2188dd7c69c" providerId="LiveId" clId="{911E53D0-6D11-4D04-8F07-4E216A199E4D}" dt="2020-05-15T07:45:51.927" v="608" actId="1076"/>
           <ac:spMkLst>
             <pc:docMk/>
             <pc:sldMk cId="3485031575" sldId="256"/>
@@ -174,8 +174,8 @@
           </ac:picMkLst>
         </pc:picChg>
       </pc:sldChg>
-      <pc:sldChg chg="addSp delSp modSp new mod modAnim">
-        <pc:chgData name="Marco Delgado Schwartz" userId="b344b2188dd7c69c" providerId="LiveId" clId="{911E53D0-6D11-4D04-8F07-4E216A199E4D}" dt="2020-05-15T07:27:57.696" v="550" actId="167"/>
+      <pc:sldChg chg="addSp delSp modSp new mod delAnim modAnim">
+        <pc:chgData name="Marco Delgado Schwartz" userId="b344b2188dd7c69c" providerId="LiveId" clId="{911E53D0-6D11-4D04-8F07-4E216A199E4D}" dt="2020-05-15T07:43:25.846" v="556" actId="1076"/>
         <pc:sldMkLst>
           <pc:docMk/>
           <pc:sldMk cId="690352910" sldId="257"/>
@@ -196,8 +196,8 @@
             <ac:spMk id="3" creationId="{A04B72BB-2778-445B-9117-716AFF3A2044}"/>
           </ac:spMkLst>
         </pc:spChg>
-        <pc:spChg chg="add mod">
-          <ac:chgData name="Marco Delgado Schwartz" userId="b344b2188dd7c69c" providerId="LiveId" clId="{911E53D0-6D11-4D04-8F07-4E216A199E4D}" dt="2020-05-15T07:22:37.312" v="493" actId="1076"/>
+        <pc:spChg chg="add del mod">
+          <ac:chgData name="Marco Delgado Schwartz" userId="b344b2188dd7c69c" providerId="LiveId" clId="{911E53D0-6D11-4D04-8F07-4E216A199E4D}" dt="2020-05-15T07:42:52.106" v="553" actId="478"/>
           <ac:spMkLst>
             <pc:docMk/>
             <pc:sldMk cId="690352910" sldId="257"/>
@@ -205,7 +205,7 @@
           </ac:spMkLst>
         </pc:spChg>
         <pc:picChg chg="add mod ord">
-          <ac:chgData name="Marco Delgado Schwartz" userId="b344b2188dd7c69c" providerId="LiveId" clId="{911E53D0-6D11-4D04-8F07-4E216A199E4D}" dt="2020-05-15T07:27:57.696" v="550" actId="167"/>
+          <ac:chgData name="Marco Delgado Schwartz" userId="b344b2188dd7c69c" providerId="LiveId" clId="{911E53D0-6D11-4D04-8F07-4E216A199E4D}" dt="2020-05-15T07:43:25.846" v="556" actId="1076"/>
           <ac:picMkLst>
             <pc:docMk/>
             <pc:sldMk cId="690352910" sldId="257"/>
@@ -259,8 +259,8 @@
           </ac:spMkLst>
         </pc:spChg>
       </pc:sldChg>
-      <pc:sldChg chg="addSp delSp modSp add mod">
-        <pc:chgData name="Marco Delgado Schwartz" userId="b344b2188dd7c69c" providerId="LiveId" clId="{911E53D0-6D11-4D04-8F07-4E216A199E4D}" dt="2020-05-15T07:14:27.826" v="106" actId="1076"/>
+      <pc:sldChg chg="addSp delSp modSp add mod modTransition">
+        <pc:chgData name="Marco Delgado Schwartz" userId="b344b2188dd7c69c" providerId="LiveId" clId="{911E53D0-6D11-4D04-8F07-4E216A199E4D}" dt="2020-05-15T07:40:19.510" v="551"/>
         <pc:sldMkLst>
           <pc:docMk/>
           <pc:sldMk cId="1512823589" sldId="266"/>
@@ -289,6 +289,13 @@
             <ac:picMk id="5" creationId="{59A3F04E-0FC0-4E86-8815-86D938CBC6EC}"/>
           </ac:picMkLst>
         </pc:picChg>
+      </pc:sldChg>
+      <pc:sldChg chg="add del modTransition">
+        <pc:chgData name="Marco Delgado Schwartz" userId="b344b2188dd7c69c" providerId="LiveId" clId="{911E53D0-6D11-4D04-8F07-4E216A199E4D}" dt="2020-05-15T08:12:09.907" v="628" actId="47"/>
+        <pc:sldMkLst>
+          <pc:docMk/>
+          <pc:sldMk cId="3391530520" sldId="267"/>
+        </pc:sldMkLst>
       </pc:sldChg>
       <pc:sldChg chg="add del">
         <pc:chgData name="Marco Delgado Schwartz" userId="b344b2188dd7c69c" providerId="LiveId" clId="{911E53D0-6D11-4D04-8F07-4E216A199E4D}" dt="2020-05-15T07:02:09.995" v="5" actId="47"/>
@@ -2569,7 +2576,7 @@
         <p:spPr>
           <a:xfrm>
             <a:off x="2514600" y="3902241"/>
-            <a:ext cx="7777390" cy="838201"/>
+            <a:ext cx="7777390" cy="1191654"/>
           </a:xfrm>
           <a:solidFill>
             <a:srgbClr val="00B0F0"/>
@@ -2587,6 +2594,58 @@
               </a:rPr>
               <a:t>SC42035 - Integration Project</a:t>
             </a:r>
+            <a:br>
+              <a:rPr lang="en-GB" sz="4400" dirty="0">
+                <a:solidFill>
+                  <a:schemeClr val="bg1"/>
+                </a:solidFill>
+              </a:rPr>
+            </a:br>
+            <a:r>
+              <a:rPr lang="en-GB" sz="3200" dirty="0">
+                <a:solidFill>
+                  <a:schemeClr val="bg1"/>
+                </a:solidFill>
+              </a:rPr>
+              <a:t>1</a:t>
+            </a:r>
+            <a:r>
+              <a:rPr lang="en-GB" sz="3200" baseline="30000" dirty="0">
+                <a:solidFill>
+                  <a:schemeClr val="bg1"/>
+                </a:solidFill>
+              </a:rPr>
+              <a:t>st</a:t>
+            </a:r>
+            <a:r>
+              <a:rPr lang="en-GB" sz="3200" dirty="0">
+                <a:solidFill>
+                  <a:schemeClr val="bg1"/>
+                </a:solidFill>
+              </a:rPr>
+              <a:t> Discussion – 15</a:t>
+            </a:r>
+            <a:r>
+              <a:rPr lang="en-GB" sz="3200" baseline="30000" dirty="0">
+                <a:solidFill>
+                  <a:schemeClr val="bg1"/>
+                </a:solidFill>
+              </a:rPr>
+              <a:t>th</a:t>
+            </a:r>
+            <a:r>
+              <a:rPr lang="en-GB" sz="3200" dirty="0">
+                <a:solidFill>
+                  <a:schemeClr val="bg1"/>
+                </a:solidFill>
+              </a:rPr>
+              <a:t> May 2020</a:t>
+            </a:r>
+            <a:endParaRPr lang="en-GB" sz="4400" dirty="0">
+              <a:solidFill>
+                <a:schemeClr val="bg1"/>
+              </a:solidFill>
+            </a:endParaRPr>
           </a:p>
         </p:txBody>
       </p:sp>
@@ -2608,7 +2667,7 @@
         </p:nvSpPr>
         <p:spPr>
           <a:xfrm>
-            <a:off x="2534920" y="4980547"/>
+            <a:off x="2514600" y="5228196"/>
             <a:ext cx="5955759" cy="1191654"/>
           </a:xfrm>
           <a:solidFill>
@@ -2669,7 +2728,7 @@
 </file>
 
 <file path=ppt/slides/slide2.xml><?xml version="1.0" encoding="utf-8"?>
-<p:sld xmlns:a="http://schemas.openxmlformats.org/drawingml/2006/main" xmlns:r="http://schemas.openxmlformats.org/officeDocument/2006/relationships" xmlns:p="http://schemas.openxmlformats.org/presentationml/2006/main">
+<p:sld xmlns:a="http://schemas.openxmlformats.org/drawingml/2006/main" xmlns:r="http://schemas.openxmlformats.org/officeDocument/2006/relationships" xmlns:p="http://schemas.openxmlformats.org/presentationml/2006/main" show="0">
   <p:cSld>
     <p:spTree>
       <p:nvGrpSpPr>
@@ -2778,7 +2837,7 @@
         </p:blipFill>
         <p:spPr>
           <a:xfrm>
-            <a:off x="2121763" y="991776"/>
+            <a:off x="2133600" y="1439444"/>
             <a:ext cx="10984637" cy="3979112"/>
           </a:xfrm>
           <a:prstGeom prst="rect">
@@ -2814,83 +2873,6 @@
           </a:p>
         </p:txBody>
       </p:sp>
-      <p:sp>
-        <p:nvSpPr>
-          <p:cNvPr id="6" name="TextBox 5">
-            <a:extLst>
-              <a:ext uri="{FF2B5EF4-FFF2-40B4-BE49-F238E27FC236}">
-                <a16:creationId xmlns:a16="http://schemas.microsoft.com/office/drawing/2014/main" id="{FE3E2C09-4252-436A-BE3D-294FB78B3925}"/>
-              </a:ext>
-            </a:extLst>
-          </p:cNvPr>
-          <p:cNvSpPr txBox="1"/>
-          <p:nvPr/>
-        </p:nvSpPr>
-        <p:spPr>
-          <a:xfrm>
-            <a:off x="2350808" y="5204504"/>
-            <a:ext cx="9079192" cy="1323439"/>
-          </a:xfrm>
-          <a:prstGeom prst="rect">
-            <a:avLst/>
-          </a:prstGeom>
-          <a:noFill/>
-        </p:spPr>
-        <p:txBody>
-          <a:bodyPr wrap="square" rtlCol="0">
-            <a:spAutoFit/>
-          </a:bodyPr>
-          <a:lstStyle/>
-          <a:p>
-            <a:pPr marL="285750" indent="-285750">
-              <a:buFont typeface="Arial" panose="020B0604020202020204" pitchFamily="34" charset="0"/>
-              <a:buChar char="•"/>
-            </a:pPr>
-            <a:r>
-              <a:rPr lang="en-GB" sz="2000" dirty="0"/>
-              <a:t>1</a:t>
-            </a:r>
-            <a:r>
-              <a:rPr lang="en-GB" sz="2000" baseline="30000" dirty="0"/>
-              <a:t>st</a:t>
-            </a:r>
-            <a:r>
-              <a:rPr lang="en-GB" sz="2000" dirty="0"/>
-              <a:t> simple test data</a:t>
-            </a:r>
-          </a:p>
-          <a:p>
-            <a:pPr marL="285750" indent="-285750">
-              <a:buFont typeface="Arial" panose="020B0604020202020204" pitchFamily="34" charset="0"/>
-              <a:buChar char="•"/>
-            </a:pPr>
-            <a:r>
-              <a:rPr lang="en-GB" sz="2000" dirty="0"/>
-              <a:t>2 done + 1 almost = 3 SI methods</a:t>
-            </a:r>
-          </a:p>
-          <a:p>
-            <a:pPr marL="285750" indent="-285750">
-              <a:buFont typeface="Arial" panose="020B0604020202020204" pitchFamily="34" charset="0"/>
-              <a:buChar char="•"/>
-            </a:pPr>
-            <a:r>
-              <a:rPr lang="en-GB" sz="2000" dirty="0"/>
-              <a:t>Next: set up proper experiment</a:t>
-            </a:r>
-          </a:p>
-          <a:p>
-            <a:pPr marL="285750" indent="-285750">
-              <a:buFont typeface="Arial" panose="020B0604020202020204" pitchFamily="34" charset="0"/>
-              <a:buChar char="•"/>
-            </a:pPr>
-            <a:r>
-              <a:rPr lang="en-GB" sz="2000" dirty="0"/>
-              <a:t>Controllers: PID, MPC (?)</a:t>
-            </a:r>
-          </a:p>
-        </p:txBody>
-      </p:sp>
     </p:spTree>
     <p:extLst>
       <p:ext uri="{BB962C8B-B14F-4D97-AF65-F5344CB8AC3E}">
@@ -2901,232 +2883,6 @@
   <p:clrMapOvr>
     <a:masterClrMapping/>
   </p:clrMapOvr>
-  <p:timing>
-    <p:tnLst>
-      <p:par>
-        <p:cTn id="1" dur="indefinite" restart="never" nodeType="tmRoot">
-          <p:childTnLst>
-            <p:seq concurrent="1" nextAc="seek">
-              <p:cTn id="2" dur="indefinite" nodeType="mainSeq">
-                <p:childTnLst>
-                  <p:par>
-                    <p:cTn id="3" fill="hold">
-                      <p:stCondLst>
-                        <p:cond delay="indefinite"/>
-                      </p:stCondLst>
-                      <p:childTnLst>
-                        <p:par>
-                          <p:cTn id="4" fill="hold">
-                            <p:stCondLst>
-                              <p:cond delay="0"/>
-                            </p:stCondLst>
-                            <p:childTnLst>
-                              <p:par>
-                                <p:cTn id="5" presetID="1" presetClass="entr" presetSubtype="0" fill="hold" nodeType="clickEffect">
-                                  <p:stCondLst>
-                                    <p:cond delay="0"/>
-                                  </p:stCondLst>
-                                  <p:childTnLst>
-                                    <p:set>
-                                      <p:cBhvr>
-                                        <p:cTn id="6" dur="1" fill="hold">
-                                          <p:stCondLst>
-                                            <p:cond delay="0"/>
-                                          </p:stCondLst>
-                                        </p:cTn>
-                                        <p:tgtEl>
-                                          <p:spTgt spid="6">
-                                            <p:txEl>
-                                              <p:pRg st="0" end="0"/>
-                                            </p:txEl>
-                                          </p:spTgt>
-                                        </p:tgtEl>
-                                        <p:attrNameLst>
-                                          <p:attrName>style.visibility</p:attrName>
-                                        </p:attrNameLst>
-                                      </p:cBhvr>
-                                      <p:to>
-                                        <p:strVal val="visible"/>
-                                      </p:to>
-                                    </p:set>
-                                  </p:childTnLst>
-                                </p:cTn>
-                              </p:par>
-                            </p:childTnLst>
-                          </p:cTn>
-                        </p:par>
-                      </p:childTnLst>
-                    </p:cTn>
-                  </p:par>
-                  <p:par>
-                    <p:cTn id="7" fill="hold">
-                      <p:stCondLst>
-                        <p:cond delay="indefinite"/>
-                      </p:stCondLst>
-                      <p:childTnLst>
-                        <p:par>
-                          <p:cTn id="8" fill="hold">
-                            <p:stCondLst>
-                              <p:cond delay="0"/>
-                            </p:stCondLst>
-                            <p:childTnLst>
-                              <p:par>
-                                <p:cTn id="9" presetID="1" presetClass="entr" presetSubtype="0" fill="hold" nodeType="clickEffect">
-                                  <p:stCondLst>
-                                    <p:cond delay="0"/>
-                                  </p:stCondLst>
-                                  <p:childTnLst>
-                                    <p:set>
-                                      <p:cBhvr>
-                                        <p:cTn id="10" dur="1" fill="hold">
-                                          <p:stCondLst>
-                                            <p:cond delay="0"/>
-                                          </p:stCondLst>
-                                        </p:cTn>
-                                        <p:tgtEl>
-                                          <p:spTgt spid="6">
-                                            <p:txEl>
-                                              <p:pRg st="1" end="1"/>
-                                            </p:txEl>
-                                          </p:spTgt>
-                                        </p:tgtEl>
-                                        <p:attrNameLst>
-                                          <p:attrName>style.visibility</p:attrName>
-                                        </p:attrNameLst>
-                                      </p:cBhvr>
-                                      <p:to>
-                                        <p:strVal val="visible"/>
-                                      </p:to>
-                                    </p:set>
-                                  </p:childTnLst>
-                                </p:cTn>
-                              </p:par>
-                            </p:childTnLst>
-                          </p:cTn>
-                        </p:par>
-                      </p:childTnLst>
-                    </p:cTn>
-                  </p:par>
-                  <p:par>
-                    <p:cTn id="11" fill="hold">
-                      <p:stCondLst>
-                        <p:cond delay="indefinite"/>
-                      </p:stCondLst>
-                      <p:childTnLst>
-                        <p:par>
-                          <p:cTn id="12" fill="hold">
-                            <p:stCondLst>
-                              <p:cond delay="0"/>
-                            </p:stCondLst>
-                            <p:childTnLst>
-                              <p:par>
-                                <p:cTn id="13" presetID="1" presetClass="entr" presetSubtype="0" fill="hold" nodeType="clickEffect">
-                                  <p:stCondLst>
-                                    <p:cond delay="0"/>
-                                  </p:stCondLst>
-                                  <p:childTnLst>
-                                    <p:set>
-                                      <p:cBhvr>
-                                        <p:cTn id="14" dur="1" fill="hold">
-                                          <p:stCondLst>
-                                            <p:cond delay="0"/>
-                                          </p:stCondLst>
-                                        </p:cTn>
-                                        <p:tgtEl>
-                                          <p:spTgt spid="6">
-                                            <p:txEl>
-                                              <p:pRg st="2" end="2"/>
-                                            </p:txEl>
-                                          </p:spTgt>
-                                        </p:tgtEl>
-                                        <p:attrNameLst>
-                                          <p:attrName>style.visibility</p:attrName>
-                                        </p:attrNameLst>
-                                      </p:cBhvr>
-                                      <p:to>
-                                        <p:strVal val="visible"/>
-                                      </p:to>
-                                    </p:set>
-                                  </p:childTnLst>
-                                </p:cTn>
-                              </p:par>
-                            </p:childTnLst>
-                          </p:cTn>
-                        </p:par>
-                      </p:childTnLst>
-                    </p:cTn>
-                  </p:par>
-                  <p:par>
-                    <p:cTn id="15" fill="hold">
-                      <p:stCondLst>
-                        <p:cond delay="indefinite"/>
-                      </p:stCondLst>
-                      <p:childTnLst>
-                        <p:par>
-                          <p:cTn id="16" fill="hold">
-                            <p:stCondLst>
-                              <p:cond delay="0"/>
-                            </p:stCondLst>
-                            <p:childTnLst>
-                              <p:par>
-                                <p:cTn id="17" presetID="1" presetClass="entr" presetSubtype="0" fill="hold" nodeType="clickEffect">
-                                  <p:stCondLst>
-                                    <p:cond delay="0"/>
-                                  </p:stCondLst>
-                                  <p:childTnLst>
-                                    <p:set>
-                                      <p:cBhvr>
-                                        <p:cTn id="18" dur="1" fill="hold">
-                                          <p:stCondLst>
-                                            <p:cond delay="0"/>
-                                          </p:stCondLst>
-                                        </p:cTn>
-                                        <p:tgtEl>
-                                          <p:spTgt spid="6">
-                                            <p:txEl>
-                                              <p:pRg st="3" end="3"/>
-                                            </p:txEl>
-                                          </p:spTgt>
-                                        </p:tgtEl>
-                                        <p:attrNameLst>
-                                          <p:attrName>style.visibility</p:attrName>
-                                        </p:attrNameLst>
-                                      </p:cBhvr>
-                                      <p:to>
-                                        <p:strVal val="visible"/>
-                                      </p:to>
-                                    </p:set>
-                                  </p:childTnLst>
-                                </p:cTn>
-                              </p:par>
-                            </p:childTnLst>
-                          </p:cTn>
-                        </p:par>
-                      </p:childTnLst>
-                    </p:cTn>
-                  </p:par>
-                </p:childTnLst>
-              </p:cTn>
-              <p:prevCondLst>
-                <p:cond evt="onPrev" delay="0">
-                  <p:tgtEl>
-                    <p:sldTgt/>
-                  </p:tgtEl>
-                </p:cond>
-              </p:prevCondLst>
-              <p:nextCondLst>
-                <p:cond evt="onNext" delay="0">
-                  <p:tgtEl>
-                    <p:sldTgt/>
-                  </p:tgtEl>
-                </p:cond>
-              </p:nextCondLst>
-            </p:seq>
-          </p:childTnLst>
-        </p:cTn>
-      </p:par>
-    </p:tnLst>
-  </p:timing>
 </p:sld>
 </file>
 

</xml_diff>